<commit_message>
Adding nodemcu and pinout doc, modify mqtt broaker public ip in code
</commit_message>
<xml_diff>
--- a/Module Test/ESP8266/Pinout.pptx
+++ b/Module Test/ESP8266/Pinout.pptx
@@ -5,7 +5,11 @@
     <p:sldMasterId id="2147483648" r:id="rId1"/>
   </p:sldMasterIdLst>
   <p:sldIdLst>
-    <p:sldId id="258" r:id="rId2"/>
+    <p:sldId id="263" r:id="rId2"/>
+    <p:sldId id="258" r:id="rId3"/>
+    <p:sldId id="260" r:id="rId4"/>
+    <p:sldId id="261" r:id="rId5"/>
+    <p:sldId id="264" r:id="rId6"/>
   </p:sldIdLst>
   <p:sldSz cx="12192000" cy="6858000"/>
   <p:notesSz cx="6858000" cy="9144000"/>
@@ -104,6 +108,11 @@
       </a:defRPr>
     </a:lvl9pPr>
   </p:defaultTextStyle>
+  <p:extLst>
+    <p:ext uri="{EFAFB233-063F-42B5-8137-9DF3F51BA10A}">
+      <p15:sldGuideLst xmlns:p15="http://schemas.microsoft.com/office/powerpoint/2012/main"/>
+    </p:ext>
+  </p:extLst>
 </p:presentation>
 </file>
 
@@ -238,7 +247,7 @@
           <a:p>
             <a:fld id="{1D55B07B-5318-4CD0-B875-3612C319D3A0}" type="datetimeFigureOut">
               <a:rPr lang="en-US" smtClean="0"/>
-              <a:t>7/8/2025</a:t>
+              <a:t>7/21/2025</a:t>
             </a:fld>
             <a:endParaRPr lang="en-US"/>
           </a:p>
@@ -408,7 +417,7 @@
           <a:p>
             <a:fld id="{1D55B07B-5318-4CD0-B875-3612C319D3A0}" type="datetimeFigureOut">
               <a:rPr lang="en-US" smtClean="0"/>
-              <a:t>7/8/2025</a:t>
+              <a:t>7/21/2025</a:t>
             </a:fld>
             <a:endParaRPr lang="en-US"/>
           </a:p>
@@ -588,7 +597,7 @@
           <a:p>
             <a:fld id="{1D55B07B-5318-4CD0-B875-3612C319D3A0}" type="datetimeFigureOut">
               <a:rPr lang="en-US" smtClean="0"/>
-              <a:t>7/8/2025</a:t>
+              <a:t>7/21/2025</a:t>
             </a:fld>
             <a:endParaRPr lang="en-US"/>
           </a:p>
@@ -758,7 +767,7 @@
           <a:p>
             <a:fld id="{1D55B07B-5318-4CD0-B875-3612C319D3A0}" type="datetimeFigureOut">
               <a:rPr lang="en-US" smtClean="0"/>
-              <a:t>7/8/2025</a:t>
+              <a:t>7/21/2025</a:t>
             </a:fld>
             <a:endParaRPr lang="en-US"/>
           </a:p>
@@ -1004,7 +1013,7 @@
           <a:p>
             <a:fld id="{1D55B07B-5318-4CD0-B875-3612C319D3A0}" type="datetimeFigureOut">
               <a:rPr lang="en-US" smtClean="0"/>
-              <a:t>7/8/2025</a:t>
+              <a:t>7/21/2025</a:t>
             </a:fld>
             <a:endParaRPr lang="en-US"/>
           </a:p>
@@ -1236,7 +1245,7 @@
           <a:p>
             <a:fld id="{1D55B07B-5318-4CD0-B875-3612C319D3A0}" type="datetimeFigureOut">
               <a:rPr lang="en-US" smtClean="0"/>
-              <a:t>7/8/2025</a:t>
+              <a:t>7/21/2025</a:t>
             </a:fld>
             <a:endParaRPr lang="en-US"/>
           </a:p>
@@ -1603,7 +1612,7 @@
           <a:p>
             <a:fld id="{1D55B07B-5318-4CD0-B875-3612C319D3A0}" type="datetimeFigureOut">
               <a:rPr lang="en-US" smtClean="0"/>
-              <a:t>7/8/2025</a:t>
+              <a:t>7/21/2025</a:t>
             </a:fld>
             <a:endParaRPr lang="en-US"/>
           </a:p>
@@ -1721,7 +1730,7 @@
           <a:p>
             <a:fld id="{1D55B07B-5318-4CD0-B875-3612C319D3A0}" type="datetimeFigureOut">
               <a:rPr lang="en-US" smtClean="0"/>
-              <a:t>7/8/2025</a:t>
+              <a:t>7/21/2025</a:t>
             </a:fld>
             <a:endParaRPr lang="en-US"/>
           </a:p>
@@ -1816,7 +1825,7 @@
           <a:p>
             <a:fld id="{1D55B07B-5318-4CD0-B875-3612C319D3A0}" type="datetimeFigureOut">
               <a:rPr lang="en-US" smtClean="0"/>
-              <a:t>7/8/2025</a:t>
+              <a:t>7/21/2025</a:t>
             </a:fld>
             <a:endParaRPr lang="en-US"/>
           </a:p>
@@ -2093,7 +2102,7 @@
           <a:p>
             <a:fld id="{1D55B07B-5318-4CD0-B875-3612C319D3A0}" type="datetimeFigureOut">
               <a:rPr lang="en-US" smtClean="0"/>
-              <a:t>7/8/2025</a:t>
+              <a:t>7/21/2025</a:t>
             </a:fld>
             <a:endParaRPr lang="en-US"/>
           </a:p>
@@ -2346,7 +2355,7 @@
           <a:p>
             <a:fld id="{1D55B07B-5318-4CD0-B875-3612C319D3A0}" type="datetimeFigureOut">
               <a:rPr lang="en-US" smtClean="0"/>
-              <a:t>7/8/2025</a:t>
+              <a:t>7/21/2025</a:t>
             </a:fld>
             <a:endParaRPr lang="en-US"/>
           </a:p>
@@ -2559,7 +2568,7 @@
           <a:p>
             <a:fld id="{1D55B07B-5318-4CD0-B875-3612C319D3A0}" type="datetimeFigureOut">
               <a:rPr lang="en-US" smtClean="0"/>
-              <a:t>7/8/2025</a:t>
+              <a:t>7/21/2025</a:t>
             </a:fld>
             <a:endParaRPr lang="en-US"/>
           </a:p>
@@ -2964,6 +2973,94 @@
           <a:chExt cx="0" cy="0"/>
         </a:xfrm>
       </p:grpSpPr>
+      <p:sp>
+        <p:nvSpPr>
+          <p:cNvPr id="2" name="Title 1"/>
+          <p:cNvSpPr>
+            <a:spLocks noGrp="1"/>
+          </p:cNvSpPr>
+          <p:nvPr>
+            <p:ph type="title"/>
+          </p:nvPr>
+        </p:nvSpPr>
+        <p:spPr>
+          <a:xfrm>
+            <a:off x="923290" y="2743199"/>
+            <a:ext cx="10515600" cy="987553"/>
+          </a:xfrm>
+        </p:spPr>
+        <p:txBody>
+          <a:bodyPr/>
+          <a:lstStyle/>
+          <a:p>
+            <a:pPr algn="ctr"/>
+            <a:r>
+              <a:rPr lang="en-US" dirty="0" smtClean="0"/>
+              <a:t>Test Module NodeMCU Code</a:t>
+            </a:r>
+            <a:endParaRPr lang="en-US" dirty="0"/>
+          </a:p>
+        </p:txBody>
+      </p:sp>
+      <p:sp>
+        <p:nvSpPr>
+          <p:cNvPr id="3" name="Text Placeholder 2"/>
+          <p:cNvSpPr>
+            <a:spLocks noGrp="1"/>
+          </p:cNvSpPr>
+          <p:nvPr>
+            <p:ph type="body" idx="1"/>
+          </p:nvPr>
+        </p:nvSpPr>
+        <p:spPr>
+          <a:xfrm>
+            <a:off x="923290" y="4113975"/>
+            <a:ext cx="10515600" cy="1500187"/>
+          </a:xfrm>
+        </p:spPr>
+        <p:txBody>
+          <a:bodyPr/>
+          <a:lstStyle/>
+          <a:p>
+            <a:pPr algn="ctr"/>
+            <a:r>
+              <a:rPr lang="en-US" dirty="0" smtClean="0"/>
+              <a:t>Network setup, topics, broker connection</a:t>
+            </a:r>
+            <a:endParaRPr lang="en-US" dirty="0"/>
+          </a:p>
+        </p:txBody>
+      </p:sp>
+    </p:spTree>
+    <p:extLst>
+      <p:ext uri="{BB962C8B-B14F-4D97-AF65-F5344CB8AC3E}">
+        <p14:creationId xmlns:p14="http://schemas.microsoft.com/office/powerpoint/2010/main" val="3461233059"/>
+      </p:ext>
+    </p:extLst>
+  </p:cSld>
+  <p:clrMapOvr>
+    <a:masterClrMapping/>
+  </p:clrMapOvr>
+</p:sld>
+</file>
+
+<file path=ppt/slides/slide2.xml><?xml version="1.0" encoding="utf-8"?>
+<p:sld xmlns:a="http://schemas.openxmlformats.org/drawingml/2006/main" xmlns:r="http://schemas.openxmlformats.org/officeDocument/2006/relationships" xmlns:p="http://schemas.openxmlformats.org/presentationml/2006/main">
+  <p:cSld>
+    <p:spTree>
+      <p:nvGrpSpPr>
+        <p:cNvPr id="1" name=""/>
+        <p:cNvGrpSpPr/>
+        <p:nvPr/>
+      </p:nvGrpSpPr>
+      <p:grpSpPr>
+        <a:xfrm>
+          <a:off x="0" y="0"/>
+          <a:ext cx="0" cy="0"/>
+          <a:chOff x="0" y="0"/>
+          <a:chExt cx="0" cy="0"/>
+        </a:xfrm>
+      </p:grpSpPr>
       <p:pic>
         <p:nvPicPr>
           <p:cNvPr id="3" name="Picture 2"/>
@@ -2996,8 +3093,8 @@
         </p:nvSpPr>
         <p:spPr>
           <a:xfrm>
-            <a:off x="4343400" y="274320"/>
-            <a:ext cx="2444900" cy="523220"/>
+            <a:off x="3913632" y="283464"/>
+            <a:ext cx="3482043" cy="523220"/>
           </a:xfrm>
           <a:prstGeom prst="rect">
             <a:avLst/>
@@ -3012,8 +3109,13 @@
           <a:p>
             <a:r>
               <a:rPr lang="en-US" sz="2800" dirty="0" smtClean="0"/>
-              <a:t>NodeMCU V2.0</a:t>
-            </a:r>
+              <a:t>NodeMCU </a:t>
+            </a:r>
+            <a:r>
+              <a:rPr lang="en-US" sz="2800" dirty="0" smtClean="0"/>
+              <a:t>V2.0 Pinout</a:t>
+            </a:r>
+            <a:endParaRPr lang="en-US" sz="2800" dirty="0" smtClean="0"/>
           </a:p>
         </p:txBody>
       </p:sp>
@@ -3021,6 +3123,851 @@
     <p:extLst>
       <p:ext uri="{BB962C8B-B14F-4D97-AF65-F5344CB8AC3E}">
         <p14:creationId xmlns:p14="http://schemas.microsoft.com/office/powerpoint/2010/main" val="3720594020"/>
+      </p:ext>
+    </p:extLst>
+  </p:cSld>
+  <p:clrMapOvr>
+    <a:masterClrMapping/>
+  </p:clrMapOvr>
+</p:sld>
+</file>
+
+<file path=ppt/slides/slide3.xml><?xml version="1.0" encoding="utf-8"?>
+<p:sld xmlns:a="http://schemas.openxmlformats.org/drawingml/2006/main" xmlns:r="http://schemas.openxmlformats.org/officeDocument/2006/relationships" xmlns:p="http://schemas.openxmlformats.org/presentationml/2006/main">
+  <p:cSld>
+    <p:spTree>
+      <p:nvGrpSpPr>
+        <p:cNvPr id="1" name=""/>
+        <p:cNvGrpSpPr/>
+        <p:nvPr/>
+      </p:nvGrpSpPr>
+      <p:grpSpPr>
+        <a:xfrm>
+          <a:off x="0" y="0"/>
+          <a:ext cx="0" cy="0"/>
+          <a:chOff x="0" y="0"/>
+          <a:chExt cx="0" cy="0"/>
+        </a:xfrm>
+      </p:grpSpPr>
+      <p:sp>
+        <p:nvSpPr>
+          <p:cNvPr id="2" name="Title 1"/>
+          <p:cNvSpPr>
+            <a:spLocks noGrp="1"/>
+          </p:cNvSpPr>
+          <p:nvPr>
+            <p:ph type="title"/>
+          </p:nvPr>
+        </p:nvSpPr>
+        <p:spPr>
+          <a:xfrm>
+            <a:off x="0" y="45085"/>
+            <a:ext cx="11768328" cy="668147"/>
+          </a:xfrm>
+        </p:spPr>
+        <p:txBody>
+          <a:bodyPr>
+            <a:normAutofit/>
+          </a:bodyPr>
+          <a:lstStyle/>
+          <a:p>
+            <a:r>
+              <a:rPr lang="en-US" sz="3600" dirty="0" smtClean="0"/>
+              <a:t>Network Setup</a:t>
+            </a:r>
+            <a:endParaRPr lang="en-US" sz="3600" dirty="0"/>
+          </a:p>
+        </p:txBody>
+      </p:sp>
+      <p:pic>
+        <p:nvPicPr>
+          <p:cNvPr id="3" name="Picture 2"/>
+          <p:cNvPicPr>
+            <a:picLocks noChangeAspect="1"/>
+          </p:cNvPicPr>
+          <p:nvPr/>
+        </p:nvPicPr>
+        <p:blipFill rotWithShape="1">
+          <a:blip r:embed="rId2"/>
+          <a:srcRect t="4323" b="10282"/>
+          <a:stretch/>
+        </p:blipFill>
+        <p:spPr>
+          <a:xfrm>
+            <a:off x="5136995" y="1812768"/>
+            <a:ext cx="6782747" cy="1179577"/>
+          </a:xfrm>
+          <a:prstGeom prst="rect">
+            <a:avLst/>
+          </a:prstGeom>
+        </p:spPr>
+      </p:pic>
+      <p:sp>
+        <p:nvSpPr>
+          <p:cNvPr id="4" name="TextBox 3"/>
+          <p:cNvSpPr txBox="1"/>
+          <p:nvPr/>
+        </p:nvSpPr>
+        <p:spPr>
+          <a:xfrm>
+            <a:off x="0" y="1005581"/>
+            <a:ext cx="8612742" cy="830997"/>
+          </a:xfrm>
+          <a:prstGeom prst="rect">
+            <a:avLst/>
+          </a:prstGeom>
+          <a:noFill/>
+        </p:spPr>
+        <p:txBody>
+          <a:bodyPr wrap="none" rtlCol="0">
+            <a:spAutoFit/>
+          </a:bodyPr>
+          <a:lstStyle/>
+          <a:p>
+            <a:pPr marL="285750" indent="-285750">
+              <a:buFont typeface="Arial" panose="020B0604020202020204" pitchFamily="34" charset="0"/>
+              <a:buChar char="•"/>
+            </a:pPr>
+            <a:r>
+              <a:rPr lang="en-US" sz="1600" dirty="0" smtClean="0"/>
+              <a:t>Check the </a:t>
+            </a:r>
+            <a:r>
+              <a:rPr lang="en-US" sz="1600" b="1" dirty="0" smtClean="0"/>
+              <a:t>Wi-Fi </a:t>
+            </a:r>
+            <a:r>
+              <a:rPr lang="en-US" sz="1600" dirty="0" smtClean="0"/>
+              <a:t>configs in code. Enter the correct ssid (network name) and password.</a:t>
+            </a:r>
+            <a:endParaRPr lang="en-US" sz="1600" dirty="0" smtClean="0">
+              <a:solidFill>
+                <a:srgbClr val="0070C0"/>
+              </a:solidFill>
+            </a:endParaRPr>
+          </a:p>
+          <a:p>
+            <a:pPr marL="285750" indent="-285750">
+              <a:buFont typeface="Arial" panose="020B0604020202020204" pitchFamily="34" charset="0"/>
+              <a:buChar char="•"/>
+            </a:pPr>
+            <a:r>
+              <a:rPr lang="en-US" sz="1600" dirty="0"/>
+              <a:t>Check the </a:t>
+            </a:r>
+            <a:r>
+              <a:rPr lang="en-US" sz="1600" b="1" dirty="0"/>
+              <a:t>MQTT Setting</a:t>
+            </a:r>
+            <a:r>
+              <a:rPr lang="en-US" sz="1600" dirty="0"/>
+              <a:t> configs in code. Enter the correct broker Public IP address in </a:t>
+            </a:r>
+            <a:r>
+              <a:rPr lang="en-US" sz="1600" dirty="0" smtClean="0">
+                <a:solidFill>
+                  <a:srgbClr val="0070C0"/>
+                </a:solidFill>
+              </a:rPr>
+              <a:t>mqtt_server.</a:t>
+            </a:r>
+          </a:p>
+          <a:p>
+            <a:pPr marL="285750" indent="-285750">
+              <a:buFont typeface="Arial" panose="020B0604020202020204" pitchFamily="34" charset="0"/>
+              <a:buChar char="•"/>
+            </a:pPr>
+            <a:endParaRPr lang="en-US" sz="1600" dirty="0">
+              <a:solidFill>
+                <a:srgbClr val="0070C0"/>
+              </a:solidFill>
+            </a:endParaRPr>
+          </a:p>
+        </p:txBody>
+      </p:sp>
+      <p:pic>
+        <p:nvPicPr>
+          <p:cNvPr id="5" name="Picture 4"/>
+          <p:cNvPicPr>
+            <a:picLocks noChangeAspect="1"/>
+          </p:cNvPicPr>
+          <p:nvPr/>
+        </p:nvPicPr>
+        <p:blipFill>
+          <a:blip r:embed="rId3"/>
+          <a:stretch>
+            <a:fillRect/>
+          </a:stretch>
+        </p:blipFill>
+        <p:spPr>
+          <a:xfrm>
+            <a:off x="132996" y="4072536"/>
+            <a:ext cx="5730746" cy="2639160"/>
+          </a:xfrm>
+          <a:prstGeom prst="rect">
+            <a:avLst/>
+          </a:prstGeom>
+        </p:spPr>
+      </p:pic>
+      <p:sp>
+        <p:nvSpPr>
+          <p:cNvPr id="6" name="TextBox 5"/>
+          <p:cNvSpPr txBox="1"/>
+          <p:nvPr/>
+        </p:nvSpPr>
+        <p:spPr>
+          <a:xfrm>
+            <a:off x="0" y="3315187"/>
+            <a:ext cx="11768328" cy="584775"/>
+          </a:xfrm>
+          <a:prstGeom prst="rect">
+            <a:avLst/>
+          </a:prstGeom>
+          <a:noFill/>
+        </p:spPr>
+        <p:txBody>
+          <a:bodyPr wrap="square" rtlCol="0">
+            <a:spAutoFit/>
+          </a:bodyPr>
+          <a:lstStyle/>
+          <a:p>
+            <a:pPr marL="285750" indent="-285750">
+              <a:buFont typeface="Arial" panose="020B0604020202020204" pitchFamily="34" charset="0"/>
+              <a:buChar char="•"/>
+            </a:pPr>
+            <a:r>
+              <a:rPr lang="en-US" sz="1600" dirty="0" smtClean="0"/>
+              <a:t>If the above settings are correct, after uploading the code into the board and opening serial monitor (in 155200 baud) you should see success output like below. </a:t>
+            </a:r>
+            <a:endParaRPr lang="en-US" sz="1600" dirty="0">
+              <a:solidFill>
+                <a:srgbClr val="0070C0"/>
+              </a:solidFill>
+            </a:endParaRPr>
+          </a:p>
+        </p:txBody>
+      </p:sp>
+      <p:pic>
+        <p:nvPicPr>
+          <p:cNvPr id="7" name="Picture 6"/>
+          <p:cNvPicPr>
+            <a:picLocks noChangeAspect="1"/>
+          </p:cNvPicPr>
+          <p:nvPr/>
+        </p:nvPicPr>
+        <p:blipFill rotWithShape="1">
+          <a:blip r:embed="rId4"/>
+          <a:srcRect r="17298"/>
+          <a:stretch/>
+        </p:blipFill>
+        <p:spPr>
+          <a:xfrm>
+            <a:off x="68988" y="1812768"/>
+            <a:ext cx="4908304" cy="781159"/>
+          </a:xfrm>
+          <a:prstGeom prst="rect">
+            <a:avLst/>
+          </a:prstGeom>
+        </p:spPr>
+      </p:pic>
+    </p:spTree>
+    <p:extLst>
+      <p:ext uri="{BB962C8B-B14F-4D97-AF65-F5344CB8AC3E}">
+        <p14:creationId xmlns:p14="http://schemas.microsoft.com/office/powerpoint/2010/main" val="4293988213"/>
+      </p:ext>
+    </p:extLst>
+  </p:cSld>
+  <p:clrMapOvr>
+    <a:masterClrMapping/>
+  </p:clrMapOvr>
+</p:sld>
+</file>
+
+<file path=ppt/slides/slide4.xml><?xml version="1.0" encoding="utf-8"?>
+<p:sld xmlns:a="http://schemas.openxmlformats.org/drawingml/2006/main" xmlns:r="http://schemas.openxmlformats.org/officeDocument/2006/relationships" xmlns:p="http://schemas.openxmlformats.org/presentationml/2006/main">
+  <p:cSld>
+    <p:spTree>
+      <p:nvGrpSpPr>
+        <p:cNvPr id="1" name=""/>
+        <p:cNvGrpSpPr/>
+        <p:nvPr/>
+      </p:nvGrpSpPr>
+      <p:grpSpPr>
+        <a:xfrm>
+          <a:off x="0" y="0"/>
+          <a:ext cx="0" cy="0"/>
+          <a:chOff x="0" y="0"/>
+          <a:chExt cx="0" cy="0"/>
+        </a:xfrm>
+      </p:grpSpPr>
+      <p:sp>
+        <p:nvSpPr>
+          <p:cNvPr id="2" name="Title 1"/>
+          <p:cNvSpPr>
+            <a:spLocks noGrp="1"/>
+          </p:cNvSpPr>
+          <p:nvPr>
+            <p:ph type="title"/>
+          </p:nvPr>
+        </p:nvSpPr>
+        <p:spPr>
+          <a:xfrm>
+            <a:off x="0" y="45085"/>
+            <a:ext cx="11768328" cy="668147"/>
+          </a:xfrm>
+        </p:spPr>
+        <p:txBody>
+          <a:bodyPr>
+            <a:normAutofit/>
+          </a:bodyPr>
+          <a:lstStyle/>
+          <a:p>
+            <a:r>
+              <a:rPr lang="en-US" sz="3600" dirty="0" smtClean="0"/>
+              <a:t>Board</a:t>
+            </a:r>
+            <a:endParaRPr lang="en-US" sz="3600" dirty="0"/>
+          </a:p>
+        </p:txBody>
+      </p:sp>
+      <p:pic>
+        <p:nvPicPr>
+          <p:cNvPr id="8" name="Picture 7"/>
+          <p:cNvPicPr>
+            <a:picLocks noChangeAspect="1"/>
+          </p:cNvPicPr>
+          <p:nvPr/>
+        </p:nvPicPr>
+        <p:blipFill>
+          <a:blip r:embed="rId2">
+            <a:extLst>
+              <a:ext uri="{28A0092B-C50C-407E-A947-70E740481C1C}">
+                <a14:useLocalDpi xmlns:a14="http://schemas.microsoft.com/office/drawing/2010/main" val="0"/>
+              </a:ext>
+            </a:extLst>
+          </a:blip>
+          <a:stretch>
+            <a:fillRect/>
+          </a:stretch>
+        </p:blipFill>
+        <p:spPr>
+          <a:xfrm>
+            <a:off x="6251061" y="1567549"/>
+            <a:ext cx="5517267" cy="3668120"/>
+          </a:xfrm>
+          <a:prstGeom prst="rect">
+            <a:avLst/>
+          </a:prstGeom>
+        </p:spPr>
+      </p:pic>
+      <p:sp>
+        <p:nvSpPr>
+          <p:cNvPr id="9" name="TextBox 8"/>
+          <p:cNvSpPr txBox="1"/>
+          <p:nvPr/>
+        </p:nvSpPr>
+        <p:spPr>
+          <a:xfrm>
+            <a:off x="177767" y="1790848"/>
+            <a:ext cx="5895525" cy="1477328"/>
+          </a:xfrm>
+          <a:prstGeom prst="rect">
+            <a:avLst/>
+          </a:prstGeom>
+          <a:noFill/>
+        </p:spPr>
+        <p:txBody>
+          <a:bodyPr wrap="none" rtlCol="0">
+            <a:spAutoFit/>
+          </a:bodyPr>
+          <a:lstStyle/>
+          <a:p>
+            <a:r>
+              <a:rPr lang="en-US" dirty="0" smtClean="0"/>
+              <a:t>Four LEDs are used in this test module</a:t>
+            </a:r>
+          </a:p>
+          <a:p>
+            <a:pPr marL="285750" indent="-285750">
+              <a:buFont typeface="Arial" panose="020B0604020202020204" pitchFamily="34" charset="0"/>
+              <a:buChar char="•"/>
+            </a:pPr>
+            <a:r>
+              <a:rPr lang="en-US" dirty="0" smtClean="0">
+                <a:solidFill>
+                  <a:srgbClr val="00B050"/>
+                </a:solidFill>
+              </a:rPr>
+              <a:t>Green</a:t>
+            </a:r>
+            <a:r>
+              <a:rPr lang="en-US" dirty="0" smtClean="0"/>
+              <a:t>: ON Wi-Fi is connected/ OFF Wi-Fi </a:t>
+            </a:r>
+            <a:r>
+              <a:rPr lang="en-US" dirty="0"/>
+              <a:t>is </a:t>
+            </a:r>
+            <a:r>
+              <a:rPr lang="en-US" dirty="0" smtClean="0"/>
+              <a:t>not connected</a:t>
+            </a:r>
+          </a:p>
+          <a:p>
+            <a:pPr marL="285750" indent="-285750">
+              <a:buFont typeface="Arial" panose="020B0604020202020204" pitchFamily="34" charset="0"/>
+              <a:buChar char="•"/>
+            </a:pPr>
+            <a:r>
+              <a:rPr lang="en-US" dirty="0" smtClean="0">
+                <a:solidFill>
+                  <a:srgbClr val="FF0000"/>
+                </a:solidFill>
+              </a:rPr>
+              <a:t>Red</a:t>
+            </a:r>
+            <a:r>
+              <a:rPr lang="en-US" dirty="0" smtClean="0"/>
+              <a:t>:     ON </a:t>
+            </a:r>
+            <a:r>
+              <a:rPr lang="en-US" dirty="0"/>
+              <a:t>Wi-Fi </a:t>
+            </a:r>
+            <a:r>
+              <a:rPr lang="en-US" dirty="0" smtClean="0"/>
+              <a:t>has disconnected</a:t>
+            </a:r>
+          </a:p>
+          <a:p>
+            <a:pPr marL="285750" indent="-285750">
+              <a:buFont typeface="Arial" panose="020B0604020202020204" pitchFamily="34" charset="0"/>
+              <a:buChar char="•"/>
+            </a:pPr>
+            <a:r>
+              <a:rPr lang="en-US" dirty="0" smtClean="0">
+                <a:solidFill>
+                  <a:srgbClr val="0070C0"/>
+                </a:solidFill>
+              </a:rPr>
+              <a:t>Blue</a:t>
+            </a:r>
+            <a:r>
+              <a:rPr lang="en-US" dirty="0" smtClean="0"/>
+              <a:t>:    Module Has sent a payload through MQTT</a:t>
+            </a:r>
+          </a:p>
+          <a:p>
+            <a:pPr marL="285750" indent="-285750">
+              <a:buFont typeface="Arial" panose="020B0604020202020204" pitchFamily="34" charset="0"/>
+              <a:buChar char="•"/>
+            </a:pPr>
+            <a:r>
+              <a:rPr lang="en-US" dirty="0" smtClean="0">
+                <a:solidFill>
+                  <a:srgbClr val="FFC000"/>
+                </a:solidFill>
+              </a:rPr>
+              <a:t>Yellow</a:t>
+            </a:r>
+            <a:r>
+              <a:rPr lang="en-US" dirty="0" smtClean="0"/>
+              <a:t>: </a:t>
+            </a:r>
+            <a:r>
+              <a:rPr lang="en-US" dirty="0"/>
+              <a:t>Module Has </a:t>
+            </a:r>
+            <a:r>
+              <a:rPr lang="en-US" dirty="0" smtClean="0"/>
+              <a:t>received a </a:t>
+            </a:r>
+            <a:r>
+              <a:rPr lang="en-US" dirty="0"/>
+              <a:t>payload </a:t>
+            </a:r>
+            <a:r>
+              <a:rPr lang="en-US" dirty="0" smtClean="0"/>
+              <a:t>from MQTT</a:t>
+            </a:r>
+            <a:endParaRPr lang="en-US" dirty="0"/>
+          </a:p>
+        </p:txBody>
+      </p:sp>
+      <p:sp>
+        <p:nvSpPr>
+          <p:cNvPr id="10" name="TextBox 9"/>
+          <p:cNvSpPr txBox="1"/>
+          <p:nvPr/>
+        </p:nvSpPr>
+        <p:spPr>
+          <a:xfrm>
+            <a:off x="177766" y="4035340"/>
+            <a:ext cx="5895526" cy="1200329"/>
+          </a:xfrm>
+          <a:prstGeom prst="rect">
+            <a:avLst/>
+          </a:prstGeom>
+          <a:noFill/>
+        </p:spPr>
+        <p:txBody>
+          <a:bodyPr wrap="square" rtlCol="0">
+            <a:spAutoFit/>
+          </a:bodyPr>
+          <a:lstStyle/>
+          <a:p>
+            <a:r>
+              <a:rPr lang="en-US" dirty="0" smtClean="0"/>
+              <a:t>At the beginning of the process all four LEDs will be On for 1 seconds.</a:t>
+            </a:r>
+          </a:p>
+          <a:p>
+            <a:endParaRPr lang="en-US" dirty="0"/>
+          </a:p>
+          <a:p>
+            <a:endParaRPr lang="en-US" dirty="0"/>
+          </a:p>
+        </p:txBody>
+      </p:sp>
+    </p:spTree>
+    <p:extLst>
+      <p:ext uri="{BB962C8B-B14F-4D97-AF65-F5344CB8AC3E}">
+        <p14:creationId xmlns:p14="http://schemas.microsoft.com/office/powerpoint/2010/main" val="628615452"/>
+      </p:ext>
+    </p:extLst>
+  </p:cSld>
+  <p:clrMapOvr>
+    <a:masterClrMapping/>
+  </p:clrMapOvr>
+</p:sld>
+</file>
+
+<file path=ppt/slides/slide5.xml><?xml version="1.0" encoding="utf-8"?>
+<p:sld xmlns:a="http://schemas.openxmlformats.org/drawingml/2006/main" xmlns:r="http://schemas.openxmlformats.org/officeDocument/2006/relationships" xmlns:p="http://schemas.openxmlformats.org/presentationml/2006/main">
+  <p:cSld>
+    <p:spTree>
+      <p:nvGrpSpPr>
+        <p:cNvPr id="1" name=""/>
+        <p:cNvGrpSpPr/>
+        <p:nvPr/>
+      </p:nvGrpSpPr>
+      <p:grpSpPr>
+        <a:xfrm>
+          <a:off x="0" y="0"/>
+          <a:ext cx="0" cy="0"/>
+          <a:chOff x="0" y="0"/>
+          <a:chExt cx="0" cy="0"/>
+        </a:xfrm>
+      </p:grpSpPr>
+      <p:sp>
+        <p:nvSpPr>
+          <p:cNvPr id="2" name="Title 1"/>
+          <p:cNvSpPr>
+            <a:spLocks noGrp="1"/>
+          </p:cNvSpPr>
+          <p:nvPr>
+            <p:ph type="title"/>
+          </p:nvPr>
+        </p:nvSpPr>
+        <p:spPr>
+          <a:xfrm>
+            <a:off x="0" y="45085"/>
+            <a:ext cx="11768328" cy="668147"/>
+          </a:xfrm>
+        </p:spPr>
+        <p:txBody>
+          <a:bodyPr>
+            <a:normAutofit/>
+          </a:bodyPr>
+          <a:lstStyle/>
+          <a:p>
+            <a:r>
+              <a:rPr lang="en-US" sz="3600" dirty="0" smtClean="0"/>
+              <a:t>Topics</a:t>
+            </a:r>
+            <a:endParaRPr lang="en-US" sz="3600" dirty="0"/>
+          </a:p>
+        </p:txBody>
+      </p:sp>
+      <p:sp>
+        <p:nvSpPr>
+          <p:cNvPr id="10" name="TextBox 9"/>
+          <p:cNvSpPr txBox="1"/>
+          <p:nvPr/>
+        </p:nvSpPr>
+        <p:spPr>
+          <a:xfrm>
+            <a:off x="7452197" y="2696926"/>
+            <a:ext cx="5313745" cy="2800767"/>
+          </a:xfrm>
+          <a:prstGeom prst="rect">
+            <a:avLst/>
+          </a:prstGeom>
+          <a:noFill/>
+        </p:spPr>
+        <p:txBody>
+          <a:bodyPr wrap="square" rtlCol="0">
+            <a:spAutoFit/>
+          </a:bodyPr>
+          <a:lstStyle/>
+          <a:p>
+            <a:r>
+              <a:rPr lang="en-US" sz="1600" dirty="0" smtClean="0"/>
+              <a:t>Publishes on: test/truck/0/data</a:t>
+            </a:r>
+          </a:p>
+          <a:p>
+            <a:pPr marL="285750" indent="-285750">
+              <a:buFont typeface="Arial" panose="020B0604020202020204" pitchFamily="34" charset="0"/>
+              <a:buChar char="•"/>
+            </a:pPr>
+            <a:r>
+              <a:rPr lang="en-US" sz="1600" dirty="0" smtClean="0"/>
+              <a:t>Can send any payload</a:t>
+            </a:r>
+          </a:p>
+          <a:p>
+            <a:pPr marL="285750" indent="-285750">
+              <a:buFont typeface="Arial" panose="020B0604020202020204" pitchFamily="34" charset="0"/>
+              <a:buChar char="•"/>
+            </a:pPr>
+            <a:endParaRPr lang="en-US" sz="1600" dirty="0" smtClean="0"/>
+          </a:p>
+          <a:p>
+            <a:endParaRPr lang="en-US" sz="1600" dirty="0" smtClean="0"/>
+          </a:p>
+          <a:p>
+            <a:pPr marL="285750" indent="-285750">
+              <a:buFont typeface="Arial" panose="020B0604020202020204" pitchFamily="34" charset="0"/>
+              <a:buChar char="•"/>
+            </a:pPr>
+            <a:endParaRPr lang="en-US" sz="1600" dirty="0"/>
+          </a:p>
+          <a:p>
+            <a:pPr marL="285750" indent="-285750">
+              <a:buFont typeface="Arial" panose="020B0604020202020204" pitchFamily="34" charset="0"/>
+              <a:buChar char="•"/>
+            </a:pPr>
+            <a:endParaRPr lang="en-US" sz="1600" dirty="0" smtClean="0"/>
+          </a:p>
+          <a:p>
+            <a:endParaRPr lang="en-US" sz="1600" dirty="0" smtClean="0"/>
+          </a:p>
+          <a:p>
+            <a:r>
+              <a:rPr lang="en-US" sz="1600" dirty="0" smtClean="0"/>
+              <a:t>Subscribes to: test/truck/0/command/lock</a:t>
+            </a:r>
+          </a:p>
+          <a:p>
+            <a:pPr marL="285750" indent="-285750">
+              <a:buFont typeface="Arial" panose="020B0604020202020204" pitchFamily="34" charset="0"/>
+              <a:buChar char="•"/>
+            </a:pPr>
+            <a:r>
+              <a:rPr lang="en-US" sz="1600" dirty="0" smtClean="0"/>
+              <a:t>Expect to receive ‘lock’ and ‘unlock’ text payloads.</a:t>
+            </a:r>
+          </a:p>
+          <a:p>
+            <a:pPr marL="285750" indent="-285750">
+              <a:buFont typeface="Arial" panose="020B0604020202020204" pitchFamily="34" charset="0"/>
+              <a:buChar char="•"/>
+            </a:pPr>
+            <a:r>
+              <a:rPr lang="en-US" sz="1600" dirty="0" smtClean="0"/>
+              <a:t>Rotates the servo motor accordingly.</a:t>
+            </a:r>
+            <a:endParaRPr lang="en-US" sz="1600" dirty="0"/>
+          </a:p>
+          <a:p>
+            <a:endParaRPr lang="en-US" sz="1600" dirty="0"/>
+          </a:p>
+        </p:txBody>
+      </p:sp>
+      <p:sp>
+        <p:nvSpPr>
+          <p:cNvPr id="3" name="Rectangle 2"/>
+          <p:cNvSpPr/>
+          <p:nvPr/>
+        </p:nvSpPr>
+        <p:spPr>
+          <a:xfrm>
+            <a:off x="0" y="2948853"/>
+            <a:ext cx="4468531" cy="338554"/>
+          </a:xfrm>
+          <a:prstGeom prst="rect">
+            <a:avLst/>
+          </a:prstGeom>
+        </p:spPr>
+        <p:txBody>
+          <a:bodyPr wrap="none">
+            <a:spAutoFit/>
+          </a:bodyPr>
+          <a:lstStyle/>
+          <a:p>
+            <a:r>
+              <a:rPr lang="en-US" sz="1600" dirty="0" smtClean="0"/>
+              <a:t>mosquitto_sub -h 2.177.238.83 -t test/truck/0/data</a:t>
+            </a:r>
+            <a:endParaRPr lang="en-US" sz="1600" dirty="0"/>
+          </a:p>
+        </p:txBody>
+      </p:sp>
+      <p:sp>
+        <p:nvSpPr>
+          <p:cNvPr id="7" name="Rectangle 6"/>
+          <p:cNvSpPr/>
+          <p:nvPr/>
+        </p:nvSpPr>
+        <p:spPr>
+          <a:xfrm>
+            <a:off x="8561246" y="1520413"/>
+            <a:ext cx="2401555" cy="369332"/>
+          </a:xfrm>
+          <a:prstGeom prst="rect">
+            <a:avLst/>
+          </a:prstGeom>
+        </p:spPr>
+        <p:txBody>
+          <a:bodyPr wrap="none">
+            <a:spAutoFit/>
+          </a:bodyPr>
+          <a:lstStyle/>
+          <a:p>
+            <a:r>
+              <a:rPr lang="en-US" b="1" dirty="0" smtClean="0"/>
+              <a:t>Test Module NodeMCU</a:t>
+            </a:r>
+            <a:endParaRPr lang="en-US" b="1" dirty="0"/>
+          </a:p>
+        </p:txBody>
+      </p:sp>
+      <p:sp>
+        <p:nvSpPr>
+          <p:cNvPr id="11" name="Rectangle 10"/>
+          <p:cNvSpPr/>
+          <p:nvPr/>
+        </p:nvSpPr>
+        <p:spPr>
+          <a:xfrm>
+            <a:off x="3117492" y="1520413"/>
+            <a:ext cx="818366" cy="369332"/>
+          </a:xfrm>
+          <a:prstGeom prst="rect">
+            <a:avLst/>
+          </a:prstGeom>
+        </p:spPr>
+        <p:txBody>
+          <a:bodyPr wrap="none">
+            <a:spAutoFit/>
+          </a:bodyPr>
+          <a:lstStyle/>
+          <a:p>
+            <a:r>
+              <a:rPr lang="en-US" b="1" dirty="0" smtClean="0"/>
+              <a:t>Broker</a:t>
+            </a:r>
+            <a:endParaRPr lang="en-US" b="1" dirty="0"/>
+          </a:p>
+        </p:txBody>
+      </p:sp>
+      <p:sp>
+        <p:nvSpPr>
+          <p:cNvPr id="4" name="Rectangle 3"/>
+          <p:cNvSpPr/>
+          <p:nvPr/>
+        </p:nvSpPr>
+        <p:spPr>
+          <a:xfrm>
+            <a:off x="0" y="4662184"/>
+            <a:ext cx="7053351" cy="338554"/>
+          </a:xfrm>
+          <a:prstGeom prst="rect">
+            <a:avLst/>
+          </a:prstGeom>
+        </p:spPr>
+        <p:txBody>
+          <a:bodyPr wrap="square">
+            <a:spAutoFit/>
+          </a:bodyPr>
+          <a:lstStyle/>
+          <a:p>
+            <a:r>
+              <a:rPr lang="en-US" sz="1600" dirty="0" err="1"/>
+              <a:t>mosquitto_pub</a:t>
+            </a:r>
+            <a:r>
+              <a:rPr lang="en-US" sz="1600" dirty="0"/>
+              <a:t> -h 2.177.238.83 -p 1883 -t "test/truck/0/command/lock" -m "lock"</a:t>
+            </a:r>
+          </a:p>
+        </p:txBody>
+      </p:sp>
+      <p:cxnSp>
+        <p:nvCxnSpPr>
+          <p:cNvPr id="6" name="Straight Connector 5"/>
+          <p:cNvCxnSpPr/>
+          <p:nvPr/>
+        </p:nvCxnSpPr>
+        <p:spPr>
+          <a:xfrm flipV="1">
+            <a:off x="0" y="3909527"/>
+            <a:ext cx="12120465" cy="32611"/>
+          </a:xfrm>
+          <a:prstGeom prst="line">
+            <a:avLst/>
+          </a:prstGeom>
+        </p:spPr>
+        <p:style>
+          <a:lnRef idx="1">
+            <a:schemeClr val="accent1"/>
+          </a:lnRef>
+          <a:fillRef idx="0">
+            <a:schemeClr val="accent1"/>
+          </a:fillRef>
+          <a:effectRef idx="0">
+            <a:schemeClr val="accent1"/>
+          </a:effectRef>
+          <a:fontRef idx="minor">
+            <a:schemeClr val="tx1"/>
+          </a:fontRef>
+        </p:style>
+      </p:cxnSp>
+      <p:cxnSp>
+        <p:nvCxnSpPr>
+          <p:cNvPr id="14" name="Straight Connector 13"/>
+          <p:cNvCxnSpPr/>
+          <p:nvPr/>
+        </p:nvCxnSpPr>
+        <p:spPr>
+          <a:xfrm flipH="1" flipV="1">
+            <a:off x="7224782" y="1222310"/>
+            <a:ext cx="27992" cy="4917232"/>
+          </a:xfrm>
+          <a:prstGeom prst="line">
+            <a:avLst/>
+          </a:prstGeom>
+        </p:spPr>
+        <p:style>
+          <a:lnRef idx="1">
+            <a:schemeClr val="accent1"/>
+          </a:lnRef>
+          <a:fillRef idx="0">
+            <a:schemeClr val="accent1"/>
+          </a:fillRef>
+          <a:effectRef idx="0">
+            <a:schemeClr val="accent1"/>
+          </a:effectRef>
+          <a:fontRef idx="minor">
+            <a:schemeClr val="tx1"/>
+          </a:fontRef>
+        </p:style>
+      </p:cxnSp>
+    </p:spTree>
+    <p:extLst>
+      <p:ext uri="{BB962C8B-B14F-4D97-AF65-F5344CB8AC3E}">
+        <p14:creationId xmlns:p14="http://schemas.microsoft.com/office/powerpoint/2010/main" val="224987687"/>
       </p:ext>
     </p:extLst>
   </p:cSld>

</xml_diff>